<commit_message>
Commit a pptx file
</commit_message>
<xml_diff>
--- a/Program_Examples/Simbo-Enermag/MagneticStructures_SimboEnermag.pptx
+++ b/Program_Examples/Simbo-Enermag/MagneticStructures_SimboEnermag.pptx
@@ -580,7 +580,7 @@
         <p:nvSpPr>
           <p:cNvPr id="2052" name="Rectangle 4"/>
           <p:cNvSpPr>
-            <a:spLocks noChangeArrowheads="1" noTextEdit="1"/>
+            <a:spLocks noGrp="1" noRot="1" noChangeAspect="1" noChangeArrowheads="1" noTextEdit="1"/>
           </p:cNvSpPr>
           <p:nvPr>
             <p:ph type="sldImg" idx="2"/>
@@ -1089,7 +1089,7 @@
         <p:nvSpPr>
           <p:cNvPr id="5123" name="Rectangle 2"/>
           <p:cNvSpPr>
-            <a:spLocks noChangeArrowheads="1" noTextEdit="1"/>
+            <a:spLocks noGrp="1" noRot="1" noChangeAspect="1" noChangeArrowheads="1" noTextEdit="1"/>
           </p:cNvSpPr>
           <p:nvPr>
             <p:ph type="sldImg"/>
@@ -5154,7 +5154,7 @@
           <a:graphicData uri="http://schemas.openxmlformats.org/presentationml/2006/ole">
             <mc:AlternateContent xmlns:mc="http://schemas.openxmlformats.org/markup-compatibility/2006">
               <mc:Choice xmlns:v="urn:schemas-microsoft-com:vml" Requires="v">
-                <p:oleObj spid="_x0000_s14361" name="Equation" r:id="rId3" imgW="2120760" imgH="749160" progId="Equation.DSMT4">
+                <p:oleObj spid="_x0000_s14371" name="Equation" r:id="rId3" imgW="2120760" imgH="749160" progId="Equation.DSMT4">
                   <p:embed/>
                 </p:oleObj>
               </mc:Choice>
@@ -5563,7 +5563,7 @@
             <a:graphicData uri="http://schemas.openxmlformats.org/presentationml/2006/ole">
               <mc:AlternateContent xmlns:mc="http://schemas.openxmlformats.org/markup-compatibility/2006">
                 <mc:Choice xmlns:v="urn:schemas-microsoft-com:vml" Requires="v">
-                  <p:oleObj spid="_x0000_s14362" name="Equation" r:id="rId5" imgW="1930320" imgH="279360" progId="Equation.DSMT4">
+                  <p:oleObj spid="_x0000_s14372" name="Equation" r:id="rId5" imgW="1930320" imgH="279360" progId="Equation.DSMT4">
                     <p:embed/>
                   </p:oleObj>
                 </mc:Choice>
@@ -5647,7 +5647,7 @@
           <a:graphicData uri="http://schemas.openxmlformats.org/presentationml/2006/ole">
             <mc:AlternateContent xmlns:mc="http://schemas.openxmlformats.org/markup-compatibility/2006">
               <mc:Choice xmlns:v="urn:schemas-microsoft-com:vml" Requires="v">
-                <p:oleObj spid="_x0000_s14363" name="Equation" r:id="rId7" imgW="3454400" imgH="558800" progId="Equation.DSMT4">
+                <p:oleObj spid="_x0000_s14373" name="Equation" r:id="rId7" imgW="3454400" imgH="558800" progId="Equation.DSMT4">
                   <p:embed/>
                 </p:oleObj>
               </mc:Choice>
@@ -5877,7 +5877,7 @@
           <a:graphicData uri="http://schemas.openxmlformats.org/presentationml/2006/ole">
             <mc:AlternateContent xmlns:mc="http://schemas.openxmlformats.org/markup-compatibility/2006">
               <mc:Choice xmlns:v="urn:schemas-microsoft-com:vml" Requires="v">
-                <p:oleObj spid="_x0000_s14364" name="Equation" r:id="rId9" imgW="5321300" imgH="355600" progId="Equation.DSMT4">
+                <p:oleObj spid="_x0000_s14374" name="Equation" r:id="rId9" imgW="5321300" imgH="355600" progId="Equation.DSMT4">
                   <p:embed/>
                 </p:oleObj>
               </mc:Choice>
@@ -6107,7 +6107,7 @@
           <a:graphicData uri="http://schemas.openxmlformats.org/presentationml/2006/ole">
             <mc:AlternateContent xmlns:mc="http://schemas.openxmlformats.org/markup-compatibility/2006">
               <mc:Choice xmlns:v="urn:schemas-microsoft-com:vml" Requires="v">
-                <p:oleObj spid="_x0000_s14365" name="Equation" r:id="rId11" imgW="1981080" imgH="736560" progId="Equation.DSMT4">
+                <p:oleObj spid="_x0000_s14375" name="Equation" r:id="rId11" imgW="1981080" imgH="736560" progId="Equation.DSMT4">
                   <p:embed/>
                 </p:oleObj>
               </mc:Choice>
@@ -7857,7 +7857,7 @@
           <a:graphicData uri="http://schemas.openxmlformats.org/presentationml/2006/ole">
             <mc:AlternateContent xmlns:mc="http://schemas.openxmlformats.org/markup-compatibility/2006">
               <mc:Choice xmlns:v="urn:schemas-microsoft-com:vml" Requires="v">
-                <p:oleObj spid="_x0000_s15381" name="Equation" r:id="rId3" imgW="2819400" imgH="762000" progId="Equation.DSMT4">
+                <p:oleObj spid="_x0000_s15387" name="Equation" r:id="rId3" imgW="2819400" imgH="762000" progId="Equation.DSMT4">
                   <p:embed/>
                 </p:oleObj>
               </mc:Choice>
@@ -8404,7 +8404,7 @@
             <a:graphicData uri="http://schemas.openxmlformats.org/presentationml/2006/ole">
               <mc:AlternateContent xmlns:mc="http://schemas.openxmlformats.org/markup-compatibility/2006">
                 <mc:Choice xmlns:v="urn:schemas-microsoft-com:vml" Requires="v">
-                  <p:oleObj spid="_x0000_s15382" name="Equation" r:id="rId5" imgW="698500" imgH="228600" progId="Equation.DSMT4">
+                  <p:oleObj spid="_x0000_s15388" name="Equation" r:id="rId5" imgW="698500" imgH="228600" progId="Equation.DSMT4">
                     <p:embed/>
                   </p:oleObj>
                 </mc:Choice>
@@ -8949,7 +8949,7 @@
           <a:graphicData uri="http://schemas.openxmlformats.org/presentationml/2006/ole">
             <mc:AlternateContent xmlns:mc="http://schemas.openxmlformats.org/markup-compatibility/2006">
               <mc:Choice xmlns:v="urn:schemas-microsoft-com:vml" Requires="v">
-                <p:oleObj spid="_x0000_s15383" name="Equation" r:id="rId7" imgW="2171700" imgH="254000" progId="Equation.DSMT4">
+                <p:oleObj spid="_x0000_s15389" name="Equation" r:id="rId7" imgW="2171700" imgH="254000" progId="Equation.DSMT4">
                   <p:embed/>
                 </p:oleObj>
               </mc:Choice>
@@ -9763,7 +9763,7 @@
           <a:graphicData uri="http://schemas.openxmlformats.org/presentationml/2006/ole">
             <mc:AlternateContent xmlns:mc="http://schemas.openxmlformats.org/markup-compatibility/2006">
               <mc:Choice xmlns:v="urn:schemas-microsoft-com:vml" Requires="v">
-                <p:oleObj spid="_x0000_s16391" name="Equation" r:id="rId3" imgW="3162300" imgH="736600" progId="Equation.DSMT4">
+                <p:oleObj spid="_x0000_s16393" name="Equation" r:id="rId3" imgW="3162300" imgH="736600" progId="Equation.DSMT4">
                   <p:embed/>
                 </p:oleObj>
               </mc:Choice>
@@ -10337,7 +10337,7 @@
           <a:graphicData uri="http://schemas.openxmlformats.org/presentationml/2006/ole">
             <mc:AlternateContent xmlns:mc="http://schemas.openxmlformats.org/markup-compatibility/2006">
               <mc:Choice xmlns:v="urn:schemas-microsoft-com:vml" Requires="v">
-                <p:oleObj spid="_x0000_s17422" name="Equation" r:id="rId3" imgW="1066800" imgH="228600" progId="Equation.DSMT4">
+                <p:oleObj spid="_x0000_s17430" name="Equation" r:id="rId3" imgW="1066800" imgH="228600" progId="Equation.DSMT4">
                   <p:embed/>
                 </p:oleObj>
               </mc:Choice>
@@ -10594,7 +10594,7 @@
           <a:graphicData uri="http://schemas.openxmlformats.org/presentationml/2006/ole">
             <mc:AlternateContent xmlns:mc="http://schemas.openxmlformats.org/markup-compatibility/2006">
               <mc:Choice xmlns:v="urn:schemas-microsoft-com:vml" Requires="v">
-                <p:oleObj spid="_x0000_s17423" name="Equation" r:id="rId5" imgW="1524000" imgH="342900" progId="Equation.DSMT4">
+                <p:oleObj spid="_x0000_s17431" name="Equation" r:id="rId5" imgW="1524000" imgH="342900" progId="Equation.DSMT4">
                   <p:embed/>
                 </p:oleObj>
               </mc:Choice>
@@ -10824,7 +10824,7 @@
           <a:graphicData uri="http://schemas.openxmlformats.org/presentationml/2006/ole">
             <mc:AlternateContent xmlns:mc="http://schemas.openxmlformats.org/markup-compatibility/2006">
               <mc:Choice xmlns:v="urn:schemas-microsoft-com:vml" Requires="v">
-                <p:oleObj spid="_x0000_s17424" name="Equation" r:id="rId7" imgW="2768400" imgH="355320" progId="Equation.DSMT4">
+                <p:oleObj spid="_x0000_s17432" name="Equation" r:id="rId7" imgW="2768400" imgH="355320" progId="Equation.DSMT4">
                   <p:embed/>
                 </p:oleObj>
               </mc:Choice>
@@ -11054,7 +11054,7 @@
           <a:graphicData uri="http://schemas.openxmlformats.org/presentationml/2006/ole">
             <mc:AlternateContent xmlns:mc="http://schemas.openxmlformats.org/markup-compatibility/2006">
               <mc:Choice xmlns:v="urn:schemas-microsoft-com:vml" Requires="v">
-                <p:oleObj spid="_x0000_s17425" name="Equation" r:id="rId9" imgW="2298700" imgH="355600" progId="Equation.DSMT4">
+                <p:oleObj spid="_x0000_s17433" name="Equation" r:id="rId9" imgW="2298700" imgH="355600" progId="Equation.DSMT4">
                   <p:embed/>
                 </p:oleObj>
               </mc:Choice>
@@ -11699,7 +11699,7 @@
           <a:graphicData uri="http://schemas.openxmlformats.org/presentationml/2006/ole">
             <mc:AlternateContent xmlns:mc="http://schemas.openxmlformats.org/markup-compatibility/2006">
               <mc:Choice xmlns:v="urn:schemas-microsoft-com:vml" Requires="v">
-                <p:oleObj spid="_x0000_s18440" name="Equation" r:id="rId3" imgW="1739880" imgH="368280" progId="Equation.DSMT4">
+                <p:oleObj spid="_x0000_s18444" name="Equation" r:id="rId3" imgW="1739880" imgH="368280" progId="Equation.DSMT4">
                   <p:embed/>
                 </p:oleObj>
               </mc:Choice>
@@ -11794,7 +11794,7 @@
           <a:graphicData uri="http://schemas.openxmlformats.org/presentationml/2006/ole">
             <mc:AlternateContent xmlns:mc="http://schemas.openxmlformats.org/markup-compatibility/2006">
               <mc:Choice xmlns:v="urn:schemas-microsoft-com:vml" Requires="v">
-                <p:oleObj spid="_x0000_s18441" name="Equation" r:id="rId5" imgW="2298700" imgH="355600" progId="Equation.DSMT4">
+                <p:oleObj spid="_x0000_s18445" name="Equation" r:id="rId5" imgW="2298700" imgH="355600" progId="Equation.DSMT4">
                   <p:embed/>
                 </p:oleObj>
               </mc:Choice>
@@ -12140,86 +12140,92 @@
           </a:lstStyle>
           <a:p>
             <a:r>
-              <a:rPr lang="en-GB" altLang="en-US" sz="2800"/>
+              <a:rPr lang="en-GB" altLang="en-US" sz="2800" dirty="0"/>
               <a:t>Classical magnetic energy: </a:t>
             </a:r>
             <a:r>
-              <a:rPr lang="en-GB" altLang="en-US" sz="2800">
+              <a:rPr lang="en-GB" altLang="en-US" sz="2800" dirty="0">
                 <a:latin typeface="Times New Roman" panose="02020603050405020304" pitchFamily="18" charset="0"/>
               </a:rPr>
               <a:t> E = -</a:t>
             </a:r>
             <a:r>
-              <a:rPr lang="en-GB" altLang="en-US" sz="5400" baseline="-4000">
+              <a:rPr lang="en-GB" altLang="en-US" sz="5400" baseline="-4000" dirty="0">
                 <a:latin typeface="Times New Roman" panose="02020603050405020304" pitchFamily="18" charset="0"/>
                 <a:sym typeface="Symbol" panose="05050102010706020507" pitchFamily="18" charset="2"/>
               </a:rPr>
               <a:t></a:t>
             </a:r>
             <a:r>
-              <a:rPr lang="en-GB" altLang="en-US" sz="2800" baseline="-25000">
+              <a:rPr lang="en-GB" altLang="en-US" sz="2800" baseline="-25000" dirty="0">
                 <a:latin typeface="Times New Roman" panose="02020603050405020304" pitchFamily="18" charset="0"/>
                 <a:sym typeface="Symbol" panose="05050102010706020507" pitchFamily="18" charset="2"/>
               </a:rPr>
               <a:t></a:t>
             </a:r>
             <a:r>
-              <a:rPr lang="en-GB" altLang="en-US" i="1" baseline="-25000">
+              <a:rPr lang="en-GB" altLang="en-US" i="1" baseline="-25000" dirty="0" err="1">
                 <a:latin typeface="Times New Roman" panose="02020603050405020304" pitchFamily="18" charset="0"/>
               </a:rPr>
               <a:t>ij</a:t>
             </a:r>
             <a:r>
-              <a:rPr lang="en-GB" altLang="en-US" sz="2800" baseline="-25000">
+              <a:rPr lang="en-GB" altLang="en-US" sz="2800" baseline="-25000" dirty="0">
                 <a:latin typeface="Times New Roman" panose="02020603050405020304" pitchFamily="18" charset="0"/>
                 <a:sym typeface="Symbol" panose="05050102010706020507" pitchFamily="18" charset="2"/>
               </a:rPr>
               <a:t> </a:t>
             </a:r>
             <a:r>
-              <a:rPr lang="en-GB" altLang="en-US" i="1">
+              <a:rPr lang="en-GB" altLang="en-US" i="1" dirty="0" err="1">
                 <a:latin typeface="Times New Roman" panose="02020603050405020304" pitchFamily="18" charset="0"/>
               </a:rPr>
               <a:t>J</a:t>
             </a:r>
             <a:r>
-              <a:rPr lang="en-GB" altLang="en-US" i="1" baseline="-25000">
+              <a:rPr lang="en-GB" altLang="en-US" i="1" baseline="-25000" dirty="0" err="1">
                 <a:latin typeface="Times New Roman" panose="02020603050405020304" pitchFamily="18" charset="0"/>
               </a:rPr>
-              <a:t>ij </a:t>
-            </a:r>
-            <a:r>
-              <a:rPr lang="en-GB" altLang="en-US" b="1">
+              <a:t>ij</a:t>
+            </a:r>
+            <a:r>
+              <a:rPr lang="en-GB" altLang="en-US" i="1" baseline="-25000" dirty="0">
                 <a:latin typeface="Times New Roman" panose="02020603050405020304" pitchFamily="18" charset="0"/>
               </a:rPr>
+              <a:t> </a:t>
+            </a:r>
+            <a:r>
+              <a:rPr lang="en-GB" altLang="en-US" b="1" dirty="0">
+                <a:latin typeface="Times New Roman" panose="02020603050405020304" pitchFamily="18" charset="0"/>
+              </a:rPr>
               <a:t>S</a:t>
             </a:r>
             <a:r>
-              <a:rPr lang="en-GB" altLang="en-US" i="1" baseline="-25000">
+              <a:rPr lang="en-GB" altLang="en-US" i="1" baseline="-25000" dirty="0">
                 <a:latin typeface="Times New Roman" panose="02020603050405020304" pitchFamily="18" charset="0"/>
               </a:rPr>
               <a:t>i</a:t>
             </a:r>
             <a:r>
-              <a:rPr lang="en-GB" altLang="en-US">
+              <a:rPr lang="en-GB" altLang="en-US" dirty="0">
                 <a:latin typeface="Times New Roman" panose="02020603050405020304" pitchFamily="18" charset="0"/>
               </a:rPr>
               <a:t> </a:t>
             </a:r>
             <a:r>
-              <a:rPr lang="en-GB" altLang="en-US" b="1">
+              <a:rPr lang="en-GB" altLang="en-US" b="1" dirty="0" err="1">
                 <a:latin typeface="Times New Roman" panose="02020603050405020304" pitchFamily="18" charset="0"/>
               </a:rPr>
               <a:t>S</a:t>
             </a:r>
             <a:r>
-              <a:rPr lang="en-GB" altLang="en-US" i="1" baseline="-25000">
+              <a:rPr lang="en-GB" altLang="en-US" i="1" baseline="-25000" dirty="0" err="1">
                 <a:latin typeface="Times New Roman" panose="02020603050405020304" pitchFamily="18" charset="0"/>
               </a:rPr>
               <a:t>j</a:t>
             </a:r>
             <a:r>
-              <a:rPr lang="en-GB" altLang="en-US">
+              <a:rPr lang="en-GB" altLang="en-US" dirty="0">
                 <a:latin typeface="Times New Roman" panose="02020603050405020304" pitchFamily="18" charset="0"/>
               </a:rPr>
               <a:t> </a:t>
@@ -12409,6 +12415,11 @@
           </p:cNvGraphicFramePr>
           <p:nvPr>
             <p:ph idx="1"/>
+            <p:extLst>
+              <p:ext uri="{D42A27DB-BD31-4B8C-83A1-F6EECF244321}">
+                <p14:modId xmlns:p14="http://schemas.microsoft.com/office/powerpoint/2010/main" val="3779890908"/>
+              </p:ext>
+            </p:extLst>
           </p:nvPr>
         </p:nvGraphicFramePr>
         <p:xfrm>
@@ -12419,7 +12430,7 @@
           <a:graphicData uri="http://schemas.openxmlformats.org/presentationml/2006/ole">
             <mc:AlternateContent xmlns:mc="http://schemas.openxmlformats.org/markup-compatibility/2006">
               <mc:Choice xmlns:v="urn:schemas-microsoft-com:vml" Requires="v">
-                <p:oleObj spid="_x0000_s19463" name="Equation" r:id="rId3" imgW="1676160" imgH="368280" progId="Equation.DSMT4">
+                <p:oleObj spid="_x0000_s19465" name="Equation" r:id="rId3" imgW="1676160" imgH="368280" progId="Equation.DSMT4">
                   <p:embed/>
                 </p:oleObj>
               </mc:Choice>
@@ -13878,7 +13889,7 @@
           <a:graphicData uri="http://schemas.openxmlformats.org/presentationml/2006/ole">
             <mc:AlternateContent xmlns:mc="http://schemas.openxmlformats.org/markup-compatibility/2006">
               <mc:Choice xmlns:v="urn:schemas-microsoft-com:vml" Requires="v">
-                <p:oleObj spid="_x0000_s23557" name="Document" r:id="rId3" imgW="2478024" imgH="3525012" progId="Word.Document.8">
+                <p:oleObj spid="_x0000_s23561" name="Document" r:id="rId3" imgW="2478024" imgH="3525012" progId="Word.Document.8">
                   <p:embed/>
                 </p:oleObj>
               </mc:Choice>
@@ -13971,7 +13982,7 @@
           <a:graphicData uri="http://schemas.openxmlformats.org/presentationml/2006/ole">
             <mc:AlternateContent xmlns:mc="http://schemas.openxmlformats.org/markup-compatibility/2006">
               <mc:Choice xmlns:v="urn:schemas-microsoft-com:vml" Requires="v">
-                <p:oleObj spid="_x0000_s23558" name="Document" r:id="rId5" imgW="3232404" imgH="3506724" progId="Word.Document.8">
+                <p:oleObj spid="_x0000_s23562" name="Document" r:id="rId5" imgW="3232404" imgH="3506724" progId="Word.Document.8">
                   <p:embed/>
                 </p:oleObj>
               </mc:Choice>
@@ -18115,7 +18126,7 @@
           <a:graphicData uri="http://schemas.openxmlformats.org/presentationml/2006/ole">
             <mc:AlternateContent xmlns:mc="http://schemas.openxmlformats.org/markup-compatibility/2006">
               <mc:Choice xmlns:v="urn:schemas-microsoft-com:vml" Requires="v">
-                <p:oleObj spid="_x0000_s6195" name="Equation" r:id="rId3" imgW="990170" imgH="241195" progId="Equation.DSMT4">
+                <p:oleObj spid="_x0000_s6199" name="Equation" r:id="rId3" imgW="990170" imgH="241195" progId="Equation.DSMT4">
                   <p:embed/>
                 </p:oleObj>
               </mc:Choice>
@@ -18249,7 +18260,7 @@
           <a:graphicData uri="http://schemas.openxmlformats.org/presentationml/2006/ole">
             <mc:AlternateContent xmlns:mc="http://schemas.openxmlformats.org/markup-compatibility/2006">
               <mc:Choice xmlns:v="urn:schemas-microsoft-com:vml" Requires="v">
-                <p:oleObj spid="_x0000_s6196" name="Equation" r:id="rId5" imgW="507780" imgH="253890" progId="Equation.DSMT4">
+                <p:oleObj spid="_x0000_s6200" name="Equation" r:id="rId5" imgW="507780" imgH="253890" progId="Equation.DSMT4">
                   <p:embed/>
                 </p:oleObj>
               </mc:Choice>
@@ -20934,7 +20945,7 @@
           <a:graphicData uri="http://schemas.openxmlformats.org/presentationml/2006/ole">
             <mc:AlternateContent xmlns:mc="http://schemas.openxmlformats.org/markup-compatibility/2006">
               <mc:Choice xmlns:v="urn:schemas-microsoft-com:vml" Requires="v">
-                <p:oleObj spid="_x0000_s30724" name="Equation" r:id="rId3" imgW="7239000" imgH="2133600" progId="Equation.DSMT4">
+                <p:oleObj spid="_x0000_s30726" name="Equation" r:id="rId3" imgW="7239000" imgH="2133600" progId="Equation.DSMT4">
                   <p:embed/>
                 </p:oleObj>
               </mc:Choice>
@@ -21088,7 +21099,7 @@
           <a:graphicData uri="http://schemas.openxmlformats.org/presentationml/2006/ole">
             <mc:AlternateContent xmlns:mc="http://schemas.openxmlformats.org/markup-compatibility/2006">
               <mc:Choice xmlns:v="urn:schemas-microsoft-com:vml" Requires="v">
-                <p:oleObj spid="_x0000_s31751" name="Document" r:id="rId3" imgW="4283964" imgH="2884932" progId="Word.Document.8">
+                <p:oleObj spid="_x0000_s31757" name="Document" r:id="rId3" imgW="4283964" imgH="2884932" progId="Word.Document.8">
                   <p:embed/>
                 </p:oleObj>
               </mc:Choice>
@@ -21181,7 +21192,7 @@
           <a:graphicData uri="http://schemas.openxmlformats.org/presentationml/2006/ole">
             <mc:AlternateContent xmlns:mc="http://schemas.openxmlformats.org/markup-compatibility/2006">
               <mc:Choice xmlns:v="urn:schemas-microsoft-com:vml" Requires="v">
-                <p:oleObj spid="_x0000_s31752" name="Document" r:id="rId5" imgW="4251960" imgH="2884932" progId="Word.Document.8">
+                <p:oleObj spid="_x0000_s31758" name="Document" r:id="rId5" imgW="4251960" imgH="2884932" progId="Word.Document.8">
                   <p:embed/>
                 </p:oleObj>
               </mc:Choice>
@@ -21274,7 +21285,7 @@
           <a:graphicData uri="http://schemas.openxmlformats.org/presentationml/2006/ole">
             <mc:AlternateContent xmlns:mc="http://schemas.openxmlformats.org/markup-compatibility/2006">
               <mc:Choice xmlns:v="urn:schemas-microsoft-com:vml" Requires="v">
-                <p:oleObj spid="_x0000_s31753" name="Document" r:id="rId7" imgW="4283964" imgH="2816352" progId="Word.Document.8">
+                <p:oleObj spid="_x0000_s31759" name="Document" r:id="rId7" imgW="4283964" imgH="2816352" progId="Word.Document.8">
                   <p:embed/>
                 </p:oleObj>
               </mc:Choice>
@@ -22029,114 +22040,114 @@
           </a:lstStyle>
           <a:p>
             <a:r>
-              <a:rPr lang="en-GB" altLang="en-US"/>
+              <a:rPr lang="en-GB" altLang="en-US" dirty="0"/>
               <a:t>The program handles the diagonalization of the Fourier matrix </a:t>
             </a:r>
           </a:p>
           <a:p>
             <a:r>
-              <a:rPr lang="en-GB" altLang="en-US"/>
+              <a:rPr lang="en-GB" altLang="en-US" dirty="0"/>
               <a:t>solving the parametric equation:</a:t>
             </a:r>
           </a:p>
           <a:p>
-            <a:endParaRPr lang="en-GB" altLang="en-US"/>
+            <a:endParaRPr lang="en-GB" altLang="en-US" dirty="0"/>
           </a:p>
           <a:p>
             <a:r>
-              <a:rPr lang="en-GB" altLang="en-US" b="1">
+              <a:rPr lang="en-GB" altLang="en-US" b="1" dirty="0">
                 <a:latin typeface="Times New Roman" panose="02020603050405020304" pitchFamily="18" charset="0"/>
                 <a:sym typeface="Symbol" panose="05050102010706020507" pitchFamily="18" charset="2"/>
               </a:rPr>
               <a:t>                           </a:t>
             </a:r>
             <a:r>
-              <a:rPr lang="en-GB" altLang="en-US">
+              <a:rPr lang="en-GB" altLang="en-US" dirty="0">
                 <a:latin typeface="Times New Roman" panose="02020603050405020304" pitchFamily="18" charset="0"/>
               </a:rPr>
               <a:t>(</a:t>
             </a:r>
             <a:r>
-              <a:rPr lang="en-GB" altLang="en-US" b="1">
+              <a:rPr lang="en-GB" altLang="en-US" b="1" dirty="0">
                 <a:latin typeface="Times New Roman" panose="02020603050405020304" pitchFamily="18" charset="0"/>
               </a:rPr>
               <a:t>k, J</a:t>
             </a:r>
             <a:r>
-              <a:rPr lang="en-GB" altLang="en-US">
+              <a:rPr lang="en-GB" altLang="en-US" dirty="0">
                 <a:latin typeface="Times New Roman" panose="02020603050405020304" pitchFamily="18" charset="0"/>
               </a:rPr>
               <a:t>) </a:t>
             </a:r>
             <a:r>
-              <a:rPr lang="en-GB" altLang="en-US" b="1">
+              <a:rPr lang="en-GB" altLang="en-US" b="1" dirty="0">
                 <a:latin typeface="Times New Roman" panose="02020603050405020304" pitchFamily="18" charset="0"/>
               </a:rPr>
               <a:t>v</a:t>
             </a:r>
             <a:r>
-              <a:rPr lang="en-GB" altLang="en-US">
+              <a:rPr lang="en-GB" altLang="en-US" dirty="0">
                 <a:latin typeface="Times New Roman" panose="02020603050405020304" pitchFamily="18" charset="0"/>
               </a:rPr>
               <a:t>(</a:t>
             </a:r>
             <a:r>
-              <a:rPr lang="en-GB" altLang="en-US" b="1">
+              <a:rPr lang="en-GB" altLang="en-US" b="1" dirty="0">
                 <a:latin typeface="Times New Roman" panose="02020603050405020304" pitchFamily="18" charset="0"/>
               </a:rPr>
               <a:t>k, J</a:t>
             </a:r>
             <a:r>
-              <a:rPr lang="en-GB" altLang="en-US">
+              <a:rPr lang="en-GB" altLang="en-US" dirty="0">
                 <a:latin typeface="Times New Roman" panose="02020603050405020304" pitchFamily="18" charset="0"/>
               </a:rPr>
               <a:t>)= </a:t>
             </a:r>
             <a:r>
-              <a:rPr lang="en-GB" altLang="en-US">
+              <a:rPr lang="en-GB" altLang="en-US" dirty="0">
                 <a:latin typeface="Times New Roman" panose="02020603050405020304" pitchFamily="18" charset="0"/>
                 <a:sym typeface="Symbol" panose="05050102010706020507" pitchFamily="18" charset="2"/>
               </a:rPr>
               <a:t></a:t>
             </a:r>
             <a:r>
-              <a:rPr lang="en-GB" altLang="en-US">
+              <a:rPr lang="en-GB" altLang="en-US" dirty="0">
                 <a:latin typeface="Times New Roman" panose="02020603050405020304" pitchFamily="18" charset="0"/>
               </a:rPr>
               <a:t>(</a:t>
             </a:r>
             <a:r>
-              <a:rPr lang="en-GB" altLang="en-US" b="1">
+              <a:rPr lang="en-GB" altLang="en-US" b="1" dirty="0">
                 <a:latin typeface="Times New Roman" panose="02020603050405020304" pitchFamily="18" charset="0"/>
               </a:rPr>
               <a:t>k, J</a:t>
             </a:r>
             <a:r>
-              <a:rPr lang="en-GB" altLang="en-US">
+              <a:rPr lang="en-GB" altLang="en-US" dirty="0">
                 <a:latin typeface="Times New Roman" panose="02020603050405020304" pitchFamily="18" charset="0"/>
               </a:rPr>
               <a:t>)</a:t>
             </a:r>
             <a:r>
-              <a:rPr lang="en-GB" altLang="en-US" b="1">
+              <a:rPr lang="en-GB" altLang="en-US" b="1" dirty="0">
                 <a:latin typeface="Times New Roman" panose="02020603050405020304" pitchFamily="18" charset="0"/>
               </a:rPr>
               <a:t> v</a:t>
             </a:r>
             <a:r>
-              <a:rPr lang="en-GB" altLang="en-US">
+              <a:rPr lang="en-GB" altLang="en-US" dirty="0">
                 <a:latin typeface="Times New Roman" panose="02020603050405020304" pitchFamily="18" charset="0"/>
               </a:rPr>
               <a:t>(</a:t>
             </a:r>
             <a:r>
-              <a:rPr lang="en-GB" altLang="en-US" b="1">
+              <a:rPr lang="en-GB" altLang="en-US" b="1" dirty="0">
                 <a:latin typeface="Times New Roman" panose="02020603050405020304" pitchFamily="18" charset="0"/>
               </a:rPr>
               <a:t>k, J</a:t>
             </a:r>
             <a:r>
-              <a:rPr lang="en-GB" altLang="en-US">
+              <a:rPr lang="en-GB" altLang="en-US" dirty="0">
                 <a:latin typeface="Times New Roman" panose="02020603050405020304" pitchFamily="18" charset="0"/>
               </a:rPr>
               <a:t>)</a:t>
@@ -22292,116 +22303,122 @@
               <a:buChar char="•"/>
             </a:pPr>
             <a:r>
-              <a:rPr lang="en-GB" altLang="en-US">
+              <a:rPr lang="en-GB" altLang="en-US" dirty="0">
                 <a:latin typeface="Times New Roman" panose="02020603050405020304" pitchFamily="18" charset="0"/>
               </a:rPr>
               <a:t> </a:t>
             </a:r>
             <a:r>
-              <a:rPr lang="en-GB" altLang="en-US"/>
+              <a:rPr lang="en-GB" altLang="en-US" dirty="0"/>
               <a:t>For a given set </a:t>
             </a:r>
             <a:r>
-              <a:rPr lang="en-GB" altLang="en-US" b="1">
+              <a:rPr lang="en-GB" altLang="en-US" b="1" dirty="0">
                 <a:latin typeface="Times New Roman" panose="02020603050405020304" pitchFamily="18" charset="0"/>
               </a:rPr>
               <a:t>J </a:t>
             </a:r>
             <a:r>
-              <a:rPr lang="en-GB" altLang="en-US">
+              <a:rPr lang="en-GB" altLang="en-US" dirty="0">
                 <a:latin typeface="Times New Roman" panose="02020603050405020304" pitchFamily="18" charset="0"/>
               </a:rPr>
-              <a:t>={J</a:t>
-            </a:r>
-            <a:r>
-              <a:rPr lang="en-GB" altLang="en-US" i="1" baseline="-25000">
+              <a:t>={</a:t>
+            </a:r>
+            <a:r>
+              <a:rPr lang="en-GB" altLang="en-US" dirty="0" err="1">
                 <a:latin typeface="Times New Roman" panose="02020603050405020304" pitchFamily="18" charset="0"/>
               </a:rPr>
+              <a:t>J</a:t>
+            </a:r>
+            <a:r>
+              <a:rPr lang="en-GB" altLang="en-US" i="1" baseline="-25000" dirty="0" err="1">
+                <a:latin typeface="Times New Roman" panose="02020603050405020304" pitchFamily="18" charset="0"/>
+              </a:rPr>
               <a:t>ij</a:t>
             </a:r>
             <a:r>
-              <a:rPr lang="en-GB" altLang="en-US">
+              <a:rPr lang="en-GB" altLang="en-US" dirty="0">
                 <a:latin typeface="Times New Roman" panose="02020603050405020304" pitchFamily="18" charset="0"/>
               </a:rPr>
               <a:t>}</a:t>
             </a:r>
             <a:r>
-              <a:rPr lang="en-GB" altLang="en-US"/>
+              <a:rPr lang="en-GB" altLang="en-US" dirty="0"/>
               <a:t>, and no degeneracy, the lowest  eigenvalue</a:t>
             </a:r>
             <a:r>
-              <a:rPr lang="en-GB" altLang="en-US">
+              <a:rPr lang="en-GB" altLang="en-US" dirty="0">
                 <a:latin typeface="Times New Roman" panose="02020603050405020304" pitchFamily="18" charset="0"/>
               </a:rPr>
               <a:t> </a:t>
             </a:r>
             <a:r>
-              <a:rPr lang="en-GB" altLang="en-US">
+              <a:rPr lang="en-GB" altLang="en-US" dirty="0">
                 <a:latin typeface="Times New Roman" panose="02020603050405020304" pitchFamily="18" charset="0"/>
                 <a:sym typeface="Symbol" panose="05050102010706020507" pitchFamily="18" charset="2"/>
               </a:rPr>
               <a:t></a:t>
             </a:r>
             <a:r>
-              <a:rPr lang="en-GB" altLang="en-US" baseline="-25000">
+              <a:rPr lang="en-GB" altLang="en-US" baseline="-25000" dirty="0">
                 <a:latin typeface="Times New Roman" panose="02020603050405020304" pitchFamily="18" charset="0"/>
               </a:rPr>
               <a:t>min</a:t>
             </a:r>
             <a:r>
-              <a:rPr lang="en-GB" altLang="en-US">
+              <a:rPr lang="en-GB" altLang="en-US" dirty="0">
                 <a:latin typeface="Times New Roman" panose="02020603050405020304" pitchFamily="18" charset="0"/>
               </a:rPr>
               <a:t>(</a:t>
             </a:r>
             <a:r>
-              <a:rPr lang="en-GB" altLang="en-US" b="1">
+              <a:rPr lang="en-GB" altLang="en-US" b="1" dirty="0">
                 <a:latin typeface="Times New Roman" panose="02020603050405020304" pitchFamily="18" charset="0"/>
               </a:rPr>
               <a:t>k</a:t>
             </a:r>
             <a:r>
-              <a:rPr lang="en-GB" altLang="en-US" baseline="-25000">
+              <a:rPr lang="en-GB" altLang="en-US" baseline="-25000" dirty="0">
                 <a:latin typeface="Times New Roman" panose="02020603050405020304" pitchFamily="18" charset="0"/>
               </a:rPr>
               <a:t>0</a:t>
             </a:r>
             <a:r>
-              <a:rPr lang="en-GB" altLang="en-US" b="1">
+              <a:rPr lang="en-GB" altLang="en-US" b="1" dirty="0">
                 <a:latin typeface="Times New Roman" panose="02020603050405020304" pitchFamily="18" charset="0"/>
               </a:rPr>
               <a:t>, J</a:t>
             </a:r>
             <a:r>
-              <a:rPr lang="en-GB" altLang="en-US">
+              <a:rPr lang="en-GB" altLang="en-US" dirty="0">
                 <a:latin typeface="Times New Roman" panose="02020603050405020304" pitchFamily="18" charset="0"/>
               </a:rPr>
               <a:t>) </a:t>
             </a:r>
             <a:r>
-              <a:rPr lang="en-GB" altLang="en-US"/>
+              <a:rPr lang="en-GB" altLang="en-US" dirty="0"/>
               <a:t>occurs for a particular</a:t>
             </a:r>
             <a:r>
-              <a:rPr lang="en-GB" altLang="en-US">
+              <a:rPr lang="en-GB" altLang="en-US" dirty="0">
                 <a:latin typeface="Times New Roman" panose="02020603050405020304" pitchFamily="18" charset="0"/>
               </a:rPr>
               <a:t> </a:t>
             </a:r>
             <a:r>
-              <a:rPr lang="en-GB" altLang="en-US" b="1">
+              <a:rPr lang="en-GB" altLang="en-US" b="1" dirty="0">
                 <a:latin typeface="Times New Roman" panose="02020603050405020304" pitchFamily="18" charset="0"/>
               </a:rPr>
               <a:t>k</a:t>
             </a:r>
             <a:r>
-              <a:rPr lang="en-GB" altLang="en-US" baseline="-25000">
+              <a:rPr lang="en-GB" altLang="en-US" baseline="-25000" dirty="0">
                 <a:latin typeface="Times New Roman" panose="02020603050405020304" pitchFamily="18" charset="0"/>
               </a:rPr>
               <a:t>0</a:t>
             </a:r>
             <a:r>
-              <a:rPr lang="en-GB" altLang="en-US">
+              <a:rPr lang="en-GB" altLang="en-US" dirty="0">
                 <a:latin typeface="Times New Roman" panose="02020603050405020304" pitchFamily="18" charset="0"/>
               </a:rPr>
               <a:t>. </a:t>
@@ -22412,7 +22429,7 @@
               <a:buFontTx/>
               <a:buChar char="•"/>
             </a:pPr>
-            <a:endParaRPr lang="en-GB" altLang="en-US">
+            <a:endParaRPr lang="en-GB" altLang="en-US" dirty="0">
               <a:latin typeface="Times New Roman" panose="02020603050405020304" pitchFamily="18" charset="0"/>
             </a:endParaRPr>
           </a:p>
@@ -22422,69 +22439,69 @@
               <a:buChar char="•"/>
             </a:pPr>
             <a:r>
-              <a:rPr lang="en-GB" altLang="en-US">
+              <a:rPr lang="en-GB" altLang="en-US" dirty="0">
                 <a:latin typeface="Times New Roman" panose="02020603050405020304" pitchFamily="18" charset="0"/>
               </a:rPr>
               <a:t> </a:t>
             </a:r>
             <a:r>
-              <a:rPr lang="en-GB" altLang="en-US"/>
+              <a:rPr lang="en-GB" altLang="en-US" dirty="0"/>
               <a:t>The corresponding eigenvector</a:t>
             </a:r>
             <a:r>
-              <a:rPr lang="en-GB" altLang="en-US">
+              <a:rPr lang="en-GB" altLang="en-US" dirty="0">
                 <a:latin typeface="Times New Roman" panose="02020603050405020304" pitchFamily="18" charset="0"/>
               </a:rPr>
               <a:t> </a:t>
             </a:r>
             <a:r>
-              <a:rPr lang="en-GB" altLang="en-US" b="1">
+              <a:rPr lang="en-GB" altLang="en-US" b="1" dirty="0" err="1">
                 <a:latin typeface="Times New Roman" panose="02020603050405020304" pitchFamily="18" charset="0"/>
               </a:rPr>
               <a:t>v</a:t>
             </a:r>
             <a:r>
-              <a:rPr lang="en-GB" altLang="en-US" baseline="-25000">
+              <a:rPr lang="en-GB" altLang="en-US" baseline="-25000" dirty="0" err="1">
                 <a:latin typeface="Times New Roman" panose="02020603050405020304" pitchFamily="18" charset="0"/>
               </a:rPr>
               <a:t>min</a:t>
             </a:r>
             <a:r>
-              <a:rPr lang="en-GB" altLang="en-US">
+              <a:rPr lang="en-GB" altLang="en-US" dirty="0">
                 <a:latin typeface="Times New Roman" panose="02020603050405020304" pitchFamily="18" charset="0"/>
               </a:rPr>
               <a:t>(</a:t>
             </a:r>
             <a:r>
-              <a:rPr lang="en-GB" altLang="en-US" b="1">
+              <a:rPr lang="en-GB" altLang="en-US" b="1" dirty="0">
                 <a:latin typeface="Times New Roman" panose="02020603050405020304" pitchFamily="18" charset="0"/>
               </a:rPr>
               <a:t>k</a:t>
             </a:r>
             <a:r>
-              <a:rPr lang="en-GB" altLang="en-US" baseline="-25000">
+              <a:rPr lang="en-GB" altLang="en-US" baseline="-25000" dirty="0">
                 <a:latin typeface="Times New Roman" panose="02020603050405020304" pitchFamily="18" charset="0"/>
               </a:rPr>
               <a:t>0</a:t>
             </a:r>
             <a:r>
-              <a:rPr lang="en-GB" altLang="en-US" b="1">
+              <a:rPr lang="en-GB" altLang="en-US" b="1" dirty="0">
                 <a:latin typeface="Times New Roman" panose="02020603050405020304" pitchFamily="18" charset="0"/>
               </a:rPr>
               <a:t>, J</a:t>
             </a:r>
             <a:r>
-              <a:rPr lang="en-GB" altLang="en-US">
+              <a:rPr lang="en-GB" altLang="en-US" dirty="0">
                 <a:latin typeface="Times New Roman" panose="02020603050405020304" pitchFamily="18" charset="0"/>
               </a:rPr>
               <a:t>) </a:t>
             </a:r>
             <a:r>
-              <a:rPr lang="en-GB" altLang="en-US"/>
+              <a:rPr lang="en-GB" altLang="en-US" dirty="0"/>
               <a:t>(that may be complex for incommensurate structures), describes the spin configuration of the first ordered state</a:t>
             </a:r>
             <a:r>
-              <a:rPr lang="en-GB" altLang="en-US">
+              <a:rPr lang="en-GB" altLang="en-US" dirty="0">
                 <a:latin typeface="Times New Roman" panose="02020603050405020304" pitchFamily="18" charset="0"/>
               </a:rPr>
               <a:t> </a:t>
@@ -22508,7 +22525,7 @@
           <a:graphicData uri="http://schemas.openxmlformats.org/presentationml/2006/ole">
             <mc:AlternateContent xmlns:mc="http://schemas.openxmlformats.org/markup-compatibility/2006">
               <mc:Choice xmlns:v="urn:schemas-microsoft-com:vml" Requires="v">
-                <p:oleObj spid="_x0000_s32774" name="Equation" r:id="rId3" imgW="1676160" imgH="368280" progId="Equation.DSMT4">
+                <p:oleObj spid="_x0000_s32777" name="Equation" r:id="rId3" imgW="1676160" imgH="368280" progId="Equation.DSMT4">
                   <p:embed/>
                 </p:oleObj>
               </mc:Choice>
@@ -23337,7 +23354,7 @@
           <a:graphicData uri="http://schemas.openxmlformats.org/presentationml/2006/ole">
             <mc:AlternateContent xmlns:mc="http://schemas.openxmlformats.org/markup-compatibility/2006">
               <mc:Choice xmlns:v="urn:schemas-microsoft-com:vml" Requires="v">
-                <p:oleObj spid="_x0000_s7220" name="Equation" r:id="rId3" imgW="990170" imgH="241195" progId="Equation.DSMT4">
+                <p:oleObj spid="_x0000_s7224" name="Equation" r:id="rId3" imgW="990170" imgH="241195" progId="Equation.DSMT4">
                   <p:embed/>
                 </p:oleObj>
               </mc:Choice>
@@ -27152,7 +27169,7 @@
           <a:graphicData uri="http://schemas.openxmlformats.org/presentationml/2006/ole">
             <mc:AlternateContent xmlns:mc="http://schemas.openxmlformats.org/markup-compatibility/2006">
               <mc:Choice xmlns:v="urn:schemas-microsoft-com:vml" Requires="v">
-                <p:oleObj spid="_x0000_s7221" name="Equation" r:id="rId5" imgW="520474" imgH="253890" progId="Equation.DSMT4">
+                <p:oleObj spid="_x0000_s7225" name="Equation" r:id="rId5" imgW="520474" imgH="253890" progId="Equation.DSMT4">
                   <p:embed/>
                 </p:oleObj>
               </mc:Choice>
@@ -28915,7 +28932,7 @@
                   <a:graphicData uri="http://schemas.openxmlformats.org/presentationml/2006/ole">
                     <mc:AlternateContent xmlns:mc="http://schemas.openxmlformats.org/markup-compatibility/2006">
                       <mc:Choice xmlns:v="urn:schemas-microsoft-com:vml" Requires="v">
-                        <p:oleObj spid="_x0000_s37912" name="Bitmap Image" r:id="rId3" imgW="6140952" imgH="6066046" progId="Paint.Picture">
+                        <p:oleObj spid="_x0000_s37914" name="Bitmap Image" r:id="rId3" imgW="6140952" imgH="6066046" progId="Paint.Picture">
                           <p:embed/>
                         </p:oleObj>
                       </mc:Choice>
@@ -31782,7 +31799,7 @@
             <a:graphicData uri="http://schemas.openxmlformats.org/presentationml/2006/ole">
               <mc:AlternateContent xmlns:mc="http://schemas.openxmlformats.org/markup-compatibility/2006">
                 <mc:Choice xmlns:v="urn:schemas-microsoft-com:vml" Requires="v">
-                  <p:oleObj spid="_x0000_s38928" name="Bitmap Image" r:id="rId3" imgW="6119390" imgH="6066046" progId="Paint.Picture">
+                  <p:oleObj spid="_x0000_s38930" name="Bitmap Image" r:id="rId3" imgW="6119390" imgH="6066046" progId="Paint.Picture">
                     <p:embed/>
                   </p:oleObj>
                 </mc:Choice>
@@ -33853,7 +33870,7 @@
           <a:graphicData uri="http://schemas.openxmlformats.org/presentationml/2006/ole">
             <mc:AlternateContent xmlns:mc="http://schemas.openxmlformats.org/markup-compatibility/2006">
               <mc:Choice xmlns:v="urn:schemas-microsoft-com:vml" Requires="v">
-                <p:oleObj spid="_x0000_s39939" name="Bitmap Image" r:id="rId3" imgW="6140952" imgH="6066046" progId="Paint.Picture">
+                <p:oleObj spid="_x0000_s39941" name="Bitmap Image" r:id="rId3" imgW="6140952" imgH="6066046" progId="Paint.Picture">
                   <p:embed/>
                 </p:oleObj>
               </mc:Choice>
@@ -33979,7 +33996,7 @@
           <a:graphicData uri="http://schemas.openxmlformats.org/presentationml/2006/ole">
             <mc:AlternateContent xmlns:mc="http://schemas.openxmlformats.org/markup-compatibility/2006">
               <mc:Choice xmlns:v="urn:schemas-microsoft-com:vml" Requires="v">
-                <p:oleObj spid="_x0000_s40963" name="Bitmap Image" r:id="rId3" imgW="6095238" imgH="6088908" progId="Paint.Picture">
+                <p:oleObj spid="_x0000_s40965" name="Bitmap Image" r:id="rId3" imgW="6095238" imgH="6088908" progId="Paint.Picture">
                   <p:embed/>
                 </p:oleObj>
               </mc:Choice>
@@ -34105,7 +34122,7 @@
           <a:graphicData uri="http://schemas.openxmlformats.org/presentationml/2006/ole">
             <mc:AlternateContent xmlns:mc="http://schemas.openxmlformats.org/markup-compatibility/2006">
               <mc:Choice xmlns:v="urn:schemas-microsoft-com:vml" Requires="v">
-                <p:oleObj spid="_x0000_s41987" name="Bitmap Image" r:id="rId3" imgW="6088908" imgH="6058425" progId="Paint.Picture">
+                <p:oleObj spid="_x0000_s41989" name="Bitmap Image" r:id="rId3" imgW="6088908" imgH="6058425" progId="Paint.Picture">
                   <p:embed/>
                 </p:oleObj>
               </mc:Choice>
@@ -34231,7 +34248,7 @@
           <a:graphicData uri="http://schemas.openxmlformats.org/presentationml/2006/ole">
             <mc:AlternateContent xmlns:mc="http://schemas.openxmlformats.org/markup-compatibility/2006">
               <mc:Choice xmlns:v="urn:schemas-microsoft-com:vml" Requires="v">
-                <p:oleObj spid="_x0000_s43011" name="Bitmap Image" r:id="rId3" imgW="6134632" imgH="6066046" progId="Paint.Picture">
+                <p:oleObj spid="_x0000_s43013" name="Bitmap Image" r:id="rId3" imgW="6134632" imgH="6066046" progId="Paint.Picture">
                   <p:embed/>
                 </p:oleObj>
               </mc:Choice>
@@ -34357,7 +34374,7 @@
           <a:graphicData uri="http://schemas.openxmlformats.org/presentationml/2006/ole">
             <mc:AlternateContent xmlns:mc="http://schemas.openxmlformats.org/markup-compatibility/2006">
               <mc:Choice xmlns:v="urn:schemas-microsoft-com:vml" Requires="v">
-                <p:oleObj spid="_x0000_s44035" name="Bitmap Image" r:id="rId3" imgW="6111770" imgH="6058425" progId="Paint.Picture">
+                <p:oleObj spid="_x0000_s44037" name="Bitmap Image" r:id="rId3" imgW="6111770" imgH="6058425" progId="Paint.Picture">
                   <p:embed/>
                 </p:oleObj>
               </mc:Choice>
@@ -34483,7 +34500,7 @@
           <a:graphicData uri="http://schemas.openxmlformats.org/presentationml/2006/ole">
             <mc:AlternateContent xmlns:mc="http://schemas.openxmlformats.org/markup-compatibility/2006">
               <mc:Choice xmlns:v="urn:schemas-microsoft-com:vml" Requires="v">
-                <p:oleObj spid="_x0000_s8199" name="Equation" r:id="rId3" imgW="1727200" imgH="368300" progId="Equation.DSMT4">
+                <p:oleObj spid="_x0000_s8203" name="Equation" r:id="rId3" imgW="1727200" imgH="368300" progId="Equation.DSMT4">
                   <p:embed/>
                 </p:oleObj>
               </mc:Choice>
@@ -34829,7 +34846,7 @@
           <a:graphicData uri="http://schemas.openxmlformats.org/presentationml/2006/ole">
             <mc:AlternateContent xmlns:mc="http://schemas.openxmlformats.org/markup-compatibility/2006">
               <mc:Choice xmlns:v="urn:schemas-microsoft-com:vml" Requires="v">
-                <p:oleObj spid="_x0000_s8200" name="Equation" r:id="rId5" imgW="1879600" imgH="393700" progId="Equation.DSMT4">
+                <p:oleObj spid="_x0000_s8204" name="Equation" r:id="rId5" imgW="1879600" imgH="393700" progId="Equation.DSMT4">
                   <p:embed/>
                 </p:oleObj>
               </mc:Choice>
@@ -35156,7 +35173,7 @@
           <a:graphicData uri="http://schemas.openxmlformats.org/presentationml/2006/ole">
             <mc:AlternateContent xmlns:mc="http://schemas.openxmlformats.org/markup-compatibility/2006">
               <mc:Choice xmlns:v="urn:schemas-microsoft-com:vml" Requires="v">
-                <p:oleObj spid="_x0000_s45059" name="Bitmap Image" r:id="rId3" imgW="6119390" imgH="6043184" progId="Paint.Picture">
+                <p:oleObj spid="_x0000_s45061" name="Bitmap Image" r:id="rId3" imgW="6119390" imgH="6043184" progId="Paint.Picture">
                   <p:embed/>
                 </p:oleObj>
               </mc:Choice>
@@ -35282,7 +35299,7 @@
           <a:graphicData uri="http://schemas.openxmlformats.org/presentationml/2006/ole">
             <mc:AlternateContent xmlns:mc="http://schemas.openxmlformats.org/markup-compatibility/2006">
               <mc:Choice xmlns:v="urn:schemas-microsoft-com:vml" Requires="v">
-                <p:oleObj spid="_x0000_s46083" name="Bitmap Image" r:id="rId3" imgW="6111770" imgH="6012701" progId="Paint.Picture">
+                <p:oleObj spid="_x0000_s46085" name="Bitmap Image" r:id="rId3" imgW="6111770" imgH="6012701" progId="Paint.Picture">
                   <p:embed/>
                 </p:oleObj>
               </mc:Choice>
@@ -35408,7 +35425,7 @@
           <a:graphicData uri="http://schemas.openxmlformats.org/presentationml/2006/ole">
             <mc:AlternateContent xmlns:mc="http://schemas.openxmlformats.org/markup-compatibility/2006">
               <mc:Choice xmlns:v="urn:schemas-microsoft-com:vml" Requires="v">
-                <p:oleObj spid="_x0000_s47107" name="Bitmap Image" r:id="rId3" imgW="6119390" imgH="6066046" progId="Paint.Picture">
+                <p:oleObj spid="_x0000_s47109" name="Bitmap Image" r:id="rId3" imgW="6119390" imgH="6066046" progId="Paint.Picture">
                   <p:embed/>
                 </p:oleObj>
               </mc:Choice>
@@ -38225,7 +38242,7 @@
           <a:graphicData uri="http://schemas.openxmlformats.org/presentationml/2006/ole">
             <mc:AlternateContent xmlns:mc="http://schemas.openxmlformats.org/markup-compatibility/2006">
               <mc:Choice xmlns:v="urn:schemas-microsoft-com:vml" Requires="v">
-                <p:oleObj spid="_x0000_s9222" name="Equation" r:id="rId3" imgW="1727200" imgH="368300" progId="Equation.DSMT4">
+                <p:oleObj spid="_x0000_s9224" name="Equation" r:id="rId3" imgW="1727200" imgH="368300" progId="Equation.DSMT4">
                   <p:embed/>
                 </p:oleObj>
               </mc:Choice>
@@ -38996,7 +39013,7 @@
             <a:graphicData uri="http://schemas.openxmlformats.org/presentationml/2006/ole">
               <mc:AlternateContent xmlns:mc="http://schemas.openxmlformats.org/markup-compatibility/2006">
                 <mc:Choice xmlns:v="urn:schemas-microsoft-com:vml" Requires="v">
-                  <p:oleObj spid="_x0000_s10248" name="Equation" r:id="rId3" imgW="2108200" imgH="355600" progId="Equation.DSMT4">
+                  <p:oleObj spid="_x0000_s10250" name="Equation" r:id="rId3" imgW="2108200" imgH="355600" progId="Equation.DSMT4">
                     <p:embed/>
                   </p:oleObj>
                 </mc:Choice>
@@ -39559,7 +39576,7 @@
           <a:graphicData uri="http://schemas.openxmlformats.org/presentationml/2006/ole">
             <mc:AlternateContent xmlns:mc="http://schemas.openxmlformats.org/markup-compatibility/2006">
               <mc:Choice xmlns:v="urn:schemas-microsoft-com:vml" Requires="v">
-                <p:oleObj spid="_x0000_s11290" name="Equation" r:id="rId3" imgW="1193800" imgH="342900" progId="Equation.DSMT4">
+                <p:oleObj spid="_x0000_s11300" name="Equation" r:id="rId3" imgW="1193800" imgH="342900" progId="Equation.DSMT4">
                   <p:embed/>
                 </p:oleObj>
               </mc:Choice>
@@ -39823,7 +39840,7 @@
             <a:graphicData uri="http://schemas.openxmlformats.org/presentationml/2006/ole">
               <mc:AlternateContent xmlns:mc="http://schemas.openxmlformats.org/markup-compatibility/2006">
                 <mc:Choice xmlns:v="urn:schemas-microsoft-com:vml" Requires="v">
-                  <p:oleObj spid="_x0000_s11291" name="Equation" r:id="rId5" imgW="241195" imgH="241195" progId="Equation.DSMT4">
+                  <p:oleObj spid="_x0000_s11301" name="Equation" r:id="rId5" imgW="241195" imgH="241195" progId="Equation.DSMT4">
                     <p:embed/>
                   </p:oleObj>
                 </mc:Choice>
@@ -40195,7 +40212,7 @@
             <a:graphicData uri="http://schemas.openxmlformats.org/presentationml/2006/ole">
               <mc:AlternateContent xmlns:mc="http://schemas.openxmlformats.org/markup-compatibility/2006">
                 <mc:Choice xmlns:v="urn:schemas-microsoft-com:vml" Requires="v">
-                  <p:oleObj spid="_x0000_s11292" name="Equation" r:id="rId7" imgW="977476" imgH="355446" progId="Equation.DSMT4">
+                  <p:oleObj spid="_x0000_s11302" name="Equation" r:id="rId7" imgW="977476" imgH="355446" progId="Equation.DSMT4">
                     <p:embed/>
                   </p:oleObj>
                 </mc:Choice>
@@ -40288,7 +40305,7 @@
             <a:graphicData uri="http://schemas.openxmlformats.org/presentationml/2006/ole">
               <mc:AlternateContent xmlns:mc="http://schemas.openxmlformats.org/markup-compatibility/2006">
                 <mc:Choice xmlns:v="urn:schemas-microsoft-com:vml" Requires="v">
-                  <p:oleObj spid="_x0000_s11293" name="Equation" r:id="rId9" imgW="190500" imgH="228600" progId="Equation.DSMT4">
+                  <p:oleObj spid="_x0000_s11303" name="Equation" r:id="rId9" imgW="190500" imgH="228600" progId="Equation.DSMT4">
                     <p:embed/>
                   </p:oleObj>
                 </mc:Choice>
@@ -40381,7 +40398,7 @@
             <a:graphicData uri="http://schemas.openxmlformats.org/presentationml/2006/ole">
               <mc:AlternateContent xmlns:mc="http://schemas.openxmlformats.org/markup-compatibility/2006">
                 <mc:Choice xmlns:v="urn:schemas-microsoft-com:vml" Requires="v">
-                  <p:oleObj spid="_x0000_s11294" name="Equation" r:id="rId11" imgW="571252" imgH="228501" progId="Equation.DSMT4">
+                  <p:oleObj spid="_x0000_s11304" name="Equation" r:id="rId11" imgW="571252" imgH="228501" progId="Equation.DSMT4">
                     <p:embed/>
                   </p:oleObj>
                 </mc:Choice>
@@ -42601,7 +42618,7 @@
           <a:graphicData uri="http://schemas.openxmlformats.org/presentationml/2006/ole">
             <mc:AlternateContent xmlns:mc="http://schemas.openxmlformats.org/markup-compatibility/2006">
               <mc:Choice xmlns:v="urn:schemas-microsoft-com:vml" Requires="v">
-                <p:oleObj spid="_x0000_s12298" name="Equation" r:id="rId3" imgW="2298700" imgH="241300" progId="Equation.DSMT4">
+                <p:oleObj spid="_x0000_s12304" name="Equation" r:id="rId3" imgW="2298700" imgH="241300" progId="Equation.DSMT4">
                   <p:embed/>
                 </p:oleObj>
               </mc:Choice>
@@ -42831,7 +42848,7 @@
           <a:graphicData uri="http://schemas.openxmlformats.org/presentationml/2006/ole">
             <mc:AlternateContent xmlns:mc="http://schemas.openxmlformats.org/markup-compatibility/2006">
               <mc:Choice xmlns:v="urn:schemas-microsoft-com:vml" Requires="v">
-                <p:oleObj spid="_x0000_s12299" name="Equation" r:id="rId5" imgW="1726920" imgH="241200" progId="Equation.DSMT4">
+                <p:oleObj spid="_x0000_s12305" name="Equation" r:id="rId5" imgW="1726920" imgH="241200" progId="Equation.DSMT4">
                   <p:embed/>
                 </p:oleObj>
               </mc:Choice>
@@ -42914,7 +42931,7 @@
           <a:graphicData uri="http://schemas.openxmlformats.org/presentationml/2006/ole">
             <mc:AlternateContent xmlns:mc="http://schemas.openxmlformats.org/markup-compatibility/2006">
               <mc:Choice xmlns:v="urn:schemas-microsoft-com:vml" Requires="v">
-                <p:oleObj spid="_x0000_s12300" name="Equation" r:id="rId7" imgW="2666880" imgH="241200" progId="Equation.DSMT4">
+                <p:oleObj spid="_x0000_s12306" name="Equation" r:id="rId7" imgW="2666880" imgH="241200" progId="Equation.DSMT4">
                   <p:embed/>
                 </p:oleObj>
               </mc:Choice>
@@ -44048,7 +44065,7 @@
           <a:graphicData uri="http://schemas.openxmlformats.org/presentationml/2006/ole">
             <mc:AlternateContent xmlns:mc="http://schemas.openxmlformats.org/markup-compatibility/2006">
               <mc:Choice xmlns:v="urn:schemas-microsoft-com:vml" Requires="v">
-                <p:oleObj spid="_x0000_s13324" name="Equation" r:id="rId3" imgW="2108160" imgH="279360" progId="Equation.DSMT4">
+                <p:oleObj spid="_x0000_s13330" name="Equation" r:id="rId3" imgW="2108160" imgH="279360" progId="Equation.DSMT4">
                   <p:embed/>
                 </p:oleObj>
               </mc:Choice>
@@ -44131,7 +44148,7 @@
           <a:graphicData uri="http://schemas.openxmlformats.org/presentationml/2006/ole">
             <mc:AlternateContent xmlns:mc="http://schemas.openxmlformats.org/markup-compatibility/2006">
               <mc:Choice xmlns:v="urn:schemas-microsoft-com:vml" Requires="v">
-                <p:oleObj spid="_x0000_s13325" name="Equation" r:id="rId5" imgW="2768400" imgH="431640" progId="Equation.DSMT4">
+                <p:oleObj spid="_x0000_s13331" name="Equation" r:id="rId5" imgW="2768400" imgH="431640" progId="Equation.DSMT4">
                   <p:embed/>
                 </p:oleObj>
               </mc:Choice>
@@ -44214,7 +44231,7 @@
           <a:graphicData uri="http://schemas.openxmlformats.org/presentationml/2006/ole">
             <mc:AlternateContent xmlns:mc="http://schemas.openxmlformats.org/markup-compatibility/2006">
               <mc:Choice xmlns:v="urn:schemas-microsoft-com:vml" Requires="v">
-                <p:oleObj spid="_x0000_s13326" name="Equation" r:id="rId7" imgW="1981080" imgH="355320" progId="Equation.DSMT4">
+                <p:oleObj spid="_x0000_s13332" name="Equation" r:id="rId7" imgW="1981080" imgH="355320" progId="Equation.DSMT4">
                   <p:embed/>
                 </p:oleObj>
               </mc:Choice>

</xml_diff>